<commit_message>
new figs for newsletter
</commit_message>
<xml_diff>
--- a/pres/pres.pptx
+++ b/pres/pres.pptx
@@ -6,6 +6,7 @@
   </p:sldMasterIdLst>
   <p:sldIdLst>
     <p:sldId id="257" r:id="rId2"/>
+    <p:sldId id="258" r:id="rId3"/>
   </p:sldIdLst>
   <p:sldSz cx="12192000" cy="6858000"/>
   <p:notesSz cx="6858000" cy="9144000"/>
@@ -254,7 +255,7 @@
           <a:p>
             <a:fld id="{F7DFCFBA-4BAD-4582-90FC-093E3654B048}" type="datetimeFigureOut">
               <a:rPr lang="de-DE" smtClean="0"/>
-              <a:t>03.08.2022</a:t>
+              <a:t>19.09.2022</a:t>
             </a:fld>
             <a:endParaRPr lang="de-DE"/>
           </a:p>
@@ -424,7 +425,7 @@
           <a:p>
             <a:fld id="{F7DFCFBA-4BAD-4582-90FC-093E3654B048}" type="datetimeFigureOut">
               <a:rPr lang="de-DE" smtClean="0"/>
-              <a:t>03.08.2022</a:t>
+              <a:t>19.09.2022</a:t>
             </a:fld>
             <a:endParaRPr lang="de-DE"/>
           </a:p>
@@ -604,7 +605,7 @@
           <a:p>
             <a:fld id="{F7DFCFBA-4BAD-4582-90FC-093E3654B048}" type="datetimeFigureOut">
               <a:rPr lang="de-DE" smtClean="0"/>
-              <a:t>03.08.2022</a:t>
+              <a:t>19.09.2022</a:t>
             </a:fld>
             <a:endParaRPr lang="de-DE"/>
           </a:p>
@@ -774,7 +775,7 @@
           <a:p>
             <a:fld id="{F7DFCFBA-4BAD-4582-90FC-093E3654B048}" type="datetimeFigureOut">
               <a:rPr lang="de-DE" smtClean="0"/>
-              <a:t>03.08.2022</a:t>
+              <a:t>19.09.2022</a:t>
             </a:fld>
             <a:endParaRPr lang="de-DE"/>
           </a:p>
@@ -1020,7 +1021,7 @@
           <a:p>
             <a:fld id="{F7DFCFBA-4BAD-4582-90FC-093E3654B048}" type="datetimeFigureOut">
               <a:rPr lang="de-DE" smtClean="0"/>
-              <a:t>03.08.2022</a:t>
+              <a:t>19.09.2022</a:t>
             </a:fld>
             <a:endParaRPr lang="de-DE"/>
           </a:p>
@@ -1252,7 +1253,7 @@
           <a:p>
             <a:fld id="{F7DFCFBA-4BAD-4582-90FC-093E3654B048}" type="datetimeFigureOut">
               <a:rPr lang="de-DE" smtClean="0"/>
-              <a:t>03.08.2022</a:t>
+              <a:t>19.09.2022</a:t>
             </a:fld>
             <a:endParaRPr lang="de-DE"/>
           </a:p>
@@ -1619,7 +1620,7 @@
           <a:p>
             <a:fld id="{F7DFCFBA-4BAD-4582-90FC-093E3654B048}" type="datetimeFigureOut">
               <a:rPr lang="de-DE" smtClean="0"/>
-              <a:t>03.08.2022</a:t>
+              <a:t>19.09.2022</a:t>
             </a:fld>
             <a:endParaRPr lang="de-DE"/>
           </a:p>
@@ -1737,7 +1738,7 @@
           <a:p>
             <a:fld id="{F7DFCFBA-4BAD-4582-90FC-093E3654B048}" type="datetimeFigureOut">
               <a:rPr lang="de-DE" smtClean="0"/>
-              <a:t>03.08.2022</a:t>
+              <a:t>19.09.2022</a:t>
             </a:fld>
             <a:endParaRPr lang="de-DE"/>
           </a:p>
@@ -1832,7 +1833,7 @@
           <a:p>
             <a:fld id="{F7DFCFBA-4BAD-4582-90FC-093E3654B048}" type="datetimeFigureOut">
               <a:rPr lang="de-DE" smtClean="0"/>
-              <a:t>03.08.2022</a:t>
+              <a:t>19.09.2022</a:t>
             </a:fld>
             <a:endParaRPr lang="de-DE"/>
           </a:p>
@@ -2109,7 +2110,7 @@
           <a:p>
             <a:fld id="{F7DFCFBA-4BAD-4582-90FC-093E3654B048}" type="datetimeFigureOut">
               <a:rPr lang="de-DE" smtClean="0"/>
-              <a:t>03.08.2022</a:t>
+              <a:t>19.09.2022</a:t>
             </a:fld>
             <a:endParaRPr lang="de-DE"/>
           </a:p>
@@ -2362,7 +2363,7 @@
           <a:p>
             <a:fld id="{F7DFCFBA-4BAD-4582-90FC-093E3654B048}" type="datetimeFigureOut">
               <a:rPr lang="de-DE" smtClean="0"/>
-              <a:t>03.08.2022</a:t>
+              <a:t>19.09.2022</a:t>
             </a:fld>
             <a:endParaRPr lang="de-DE"/>
           </a:p>
@@ -2575,7 +2576,7 @@
           <a:p>
             <a:fld id="{F7DFCFBA-4BAD-4582-90FC-093E3654B048}" type="datetimeFigureOut">
               <a:rPr lang="de-DE" smtClean="0"/>
-              <a:t>03.08.2022</a:t>
+              <a:t>19.09.2022</a:t>
             </a:fld>
             <a:endParaRPr lang="de-DE"/>
           </a:p>
@@ -6436,6 +6437,840 @@
 </p:sld>
 </file>
 
+<file path=ppt/slides/slide2.xml><?xml version="1.0" encoding="utf-8"?>
+<p:sld xmlns:a="http://schemas.openxmlformats.org/drawingml/2006/main" xmlns:r="http://schemas.openxmlformats.org/officeDocument/2006/relationships" xmlns:p="http://schemas.openxmlformats.org/presentationml/2006/main">
+  <p:cSld>
+    <p:spTree>
+      <p:nvGrpSpPr>
+        <p:cNvPr id="1" name=""/>
+        <p:cNvGrpSpPr/>
+        <p:nvPr/>
+      </p:nvGrpSpPr>
+      <p:grpSpPr>
+        <a:xfrm>
+          <a:off x="0" y="0"/>
+          <a:ext cx="0" cy="0"/>
+          <a:chOff x="0" y="0"/>
+          <a:chExt cx="0" cy="0"/>
+        </a:xfrm>
+      </p:grpSpPr>
+      <p:grpSp>
+        <p:nvGrpSpPr>
+          <p:cNvPr id="2" name="Gruppieren 1"/>
+          <p:cNvGrpSpPr/>
+          <p:nvPr/>
+        </p:nvGrpSpPr>
+        <p:grpSpPr>
+          <a:xfrm>
+            <a:off x="694854" y="1844314"/>
+            <a:ext cx="1949534" cy="935123"/>
+            <a:chOff x="822241" y="1844314"/>
+            <a:chExt cx="1949534" cy="935123"/>
+          </a:xfrm>
+        </p:grpSpPr>
+        <p:sp>
+          <p:nvSpPr>
+            <p:cNvPr id="3" name="Rechteck 2"/>
+            <p:cNvSpPr/>
+            <p:nvPr/>
+          </p:nvSpPr>
+          <p:spPr>
+            <a:xfrm>
+              <a:off x="978694" y="2267133"/>
+              <a:ext cx="1559718" cy="36000"/>
+            </a:xfrm>
+            <a:prstGeom prst="rect">
+              <a:avLst/>
+            </a:prstGeom>
+            <a:gradFill flip="none" rotWithShape="1">
+              <a:gsLst>
+                <a:gs pos="0">
+                  <a:srgbClr val="67000D"/>
+                </a:gs>
+                <a:gs pos="100000">
+                  <a:srgbClr val="FFF5F0"/>
+                </a:gs>
+              </a:gsLst>
+              <a:lin ang="10800000" scaled="1"/>
+              <a:tileRect/>
+            </a:gradFill>
+            <a:ln>
+              <a:noFill/>
+            </a:ln>
+          </p:spPr>
+          <p:style>
+            <a:lnRef idx="2">
+              <a:schemeClr val="accent1">
+                <a:shade val="50000"/>
+              </a:schemeClr>
+            </a:lnRef>
+            <a:fillRef idx="1">
+              <a:schemeClr val="accent1"/>
+            </a:fillRef>
+            <a:effectRef idx="0">
+              <a:schemeClr val="accent1"/>
+            </a:effectRef>
+            <a:fontRef idx="minor">
+              <a:schemeClr val="lt1"/>
+            </a:fontRef>
+          </p:style>
+          <p:txBody>
+            <a:bodyPr rtlCol="0" anchor="ctr"/>
+            <a:lstStyle/>
+            <a:p>
+              <a:pPr algn="ctr"/>
+              <a:endParaRPr lang="de-DE">
+                <a:solidFill>
+                  <a:schemeClr val="tx1"/>
+                </a:solidFill>
+              </a:endParaRPr>
+            </a:p>
+          </p:txBody>
+        </p:sp>
+        <p:cxnSp>
+          <p:nvCxnSpPr>
+            <p:cNvPr id="4" name="Gerader Verbinder 3"/>
+            <p:cNvCxnSpPr/>
+            <p:nvPr/>
+          </p:nvCxnSpPr>
+          <p:spPr>
+            <a:xfrm>
+              <a:off x="978694" y="2267133"/>
+              <a:ext cx="0" cy="142973"/>
+            </a:xfrm>
+            <a:prstGeom prst="line">
+              <a:avLst/>
+            </a:prstGeom>
+            <a:ln w="19050">
+              <a:solidFill>
+                <a:schemeClr val="tx1"/>
+              </a:solidFill>
+            </a:ln>
+          </p:spPr>
+          <p:style>
+            <a:lnRef idx="1">
+              <a:schemeClr val="accent1"/>
+            </a:lnRef>
+            <a:fillRef idx="0">
+              <a:schemeClr val="accent1"/>
+            </a:fillRef>
+            <a:effectRef idx="0">
+              <a:schemeClr val="accent1"/>
+            </a:effectRef>
+            <a:fontRef idx="minor">
+              <a:schemeClr val="tx1"/>
+            </a:fontRef>
+          </p:style>
+        </p:cxnSp>
+        <p:cxnSp>
+          <p:nvCxnSpPr>
+            <p:cNvPr id="5" name="Gerader Verbinder 4"/>
+            <p:cNvCxnSpPr/>
+            <p:nvPr/>
+          </p:nvCxnSpPr>
+          <p:spPr>
+            <a:xfrm>
+              <a:off x="2538412" y="2267132"/>
+              <a:ext cx="0" cy="142973"/>
+            </a:xfrm>
+            <a:prstGeom prst="line">
+              <a:avLst/>
+            </a:prstGeom>
+            <a:ln w="19050">
+              <a:solidFill>
+                <a:schemeClr val="tx1"/>
+              </a:solidFill>
+            </a:ln>
+          </p:spPr>
+          <p:style>
+            <a:lnRef idx="1">
+              <a:schemeClr val="accent1"/>
+            </a:lnRef>
+            <a:fillRef idx="0">
+              <a:schemeClr val="accent1"/>
+            </a:fillRef>
+            <a:effectRef idx="0">
+              <a:schemeClr val="accent1"/>
+            </a:effectRef>
+            <a:fontRef idx="minor">
+              <a:schemeClr val="tx1"/>
+            </a:fontRef>
+          </p:style>
+        </p:cxnSp>
+        <p:sp>
+          <p:nvSpPr>
+            <p:cNvPr id="6" name="Textfeld 5"/>
+            <p:cNvSpPr txBox="1"/>
+            <p:nvPr/>
+          </p:nvSpPr>
+          <p:spPr>
+            <a:xfrm>
+              <a:off x="822241" y="2410105"/>
+              <a:ext cx="312907" cy="369332"/>
+            </a:xfrm>
+            <a:prstGeom prst="rect">
+              <a:avLst/>
+            </a:prstGeom>
+            <a:noFill/>
+          </p:spPr>
+          <p:txBody>
+            <a:bodyPr wrap="none" rtlCol="0">
+              <a:spAutoFit/>
+            </a:bodyPr>
+            <a:lstStyle/>
+            <a:p>
+              <a:pPr algn="ctr"/>
+              <a:r>
+                <a:rPr lang="de-DE" dirty="0" smtClean="0">
+                  <a:latin typeface="Corbel" panose="020B0503020204020204" pitchFamily="34" charset="0"/>
+                  <a:cs typeface="Arial" panose="020B0604020202020204" pitchFamily="34" charset="0"/>
+                </a:rPr>
+                <a:t>0</a:t>
+              </a:r>
+              <a:endParaRPr lang="de-DE" dirty="0">
+                <a:latin typeface="Corbel" panose="020B0503020204020204" pitchFamily="34" charset="0"/>
+                <a:cs typeface="Arial" panose="020B0604020202020204" pitchFamily="34" charset="0"/>
+              </a:endParaRPr>
+            </a:p>
+          </p:txBody>
+        </p:sp>
+        <p:sp>
+          <p:nvSpPr>
+            <p:cNvPr id="7" name="Textfeld 6"/>
+            <p:cNvSpPr txBox="1"/>
+            <p:nvPr/>
+          </p:nvSpPr>
+          <p:spPr>
+            <a:xfrm>
+              <a:off x="2393981" y="2410105"/>
+              <a:ext cx="288862" cy="369332"/>
+            </a:xfrm>
+            <a:prstGeom prst="rect">
+              <a:avLst/>
+            </a:prstGeom>
+            <a:noFill/>
+          </p:spPr>
+          <p:txBody>
+            <a:bodyPr wrap="none" rtlCol="0">
+              <a:spAutoFit/>
+            </a:bodyPr>
+            <a:lstStyle/>
+            <a:p>
+              <a:pPr algn="ctr"/>
+              <a:r>
+                <a:rPr lang="de-DE" dirty="0" smtClean="0">
+                  <a:latin typeface="Corbel" panose="020B0503020204020204" pitchFamily="34" charset="0"/>
+                  <a:cs typeface="Arial" panose="020B0604020202020204" pitchFamily="34" charset="0"/>
+                </a:rPr>
+                <a:t>1</a:t>
+              </a:r>
+              <a:endParaRPr lang="de-DE" dirty="0">
+                <a:latin typeface="Corbel" panose="020B0503020204020204" pitchFamily="34" charset="0"/>
+                <a:cs typeface="Arial" panose="020B0604020202020204" pitchFamily="34" charset="0"/>
+              </a:endParaRPr>
+            </a:p>
+          </p:txBody>
+        </p:sp>
+        <p:sp>
+          <p:nvSpPr>
+            <p:cNvPr id="8" name="Textfeld 7"/>
+            <p:cNvSpPr txBox="1"/>
+            <p:nvPr/>
+          </p:nvSpPr>
+          <p:spPr>
+            <a:xfrm>
+              <a:off x="864394" y="1844314"/>
+              <a:ext cx="1907381" cy="369332"/>
+            </a:xfrm>
+            <a:prstGeom prst="rect">
+              <a:avLst/>
+            </a:prstGeom>
+            <a:noFill/>
+          </p:spPr>
+          <p:txBody>
+            <a:bodyPr wrap="square" rtlCol="0">
+              <a:spAutoFit/>
+            </a:bodyPr>
+            <a:lstStyle/>
+            <a:p>
+              <a:r>
+                <a:rPr lang="de-DE" dirty="0" err="1" smtClean="0">
+                  <a:latin typeface="Corbel" panose="020B0503020204020204" pitchFamily="34" charset="0"/>
+                  <a:cs typeface="Arial" panose="020B0604020202020204" pitchFamily="34" charset="0"/>
+                </a:rPr>
+                <a:t>Middle</a:t>
+              </a:r>
+              <a:r>
+                <a:rPr lang="de-DE" dirty="0" smtClean="0">
+                  <a:latin typeface="Corbel" panose="020B0503020204020204" pitchFamily="34" charset="0"/>
+                  <a:cs typeface="Arial" panose="020B0604020202020204" pitchFamily="34" charset="0"/>
+                </a:rPr>
+                <a:t> Stone Age</a:t>
+              </a:r>
+              <a:endParaRPr lang="de-DE" dirty="0">
+                <a:latin typeface="Corbel" panose="020B0503020204020204" pitchFamily="34" charset="0"/>
+                <a:cs typeface="Arial" panose="020B0604020202020204" pitchFamily="34" charset="0"/>
+              </a:endParaRPr>
+            </a:p>
+          </p:txBody>
+        </p:sp>
+      </p:grpSp>
+      <p:grpSp>
+        <p:nvGrpSpPr>
+          <p:cNvPr id="9" name="Gruppieren 8"/>
+          <p:cNvGrpSpPr/>
+          <p:nvPr/>
+        </p:nvGrpSpPr>
+        <p:grpSpPr>
+          <a:xfrm>
+            <a:off x="694854" y="3284825"/>
+            <a:ext cx="1949534" cy="935123"/>
+            <a:chOff x="822241" y="1844314"/>
+            <a:chExt cx="1949534" cy="935123"/>
+          </a:xfrm>
+        </p:grpSpPr>
+        <p:sp>
+          <p:nvSpPr>
+            <p:cNvPr id="10" name="Rechteck 9"/>
+            <p:cNvSpPr/>
+            <p:nvPr/>
+          </p:nvSpPr>
+          <p:spPr>
+            <a:xfrm>
+              <a:off x="978694" y="2267133"/>
+              <a:ext cx="1559718" cy="36000"/>
+            </a:xfrm>
+            <a:prstGeom prst="rect">
+              <a:avLst/>
+            </a:prstGeom>
+            <a:gradFill flip="none" rotWithShape="1">
+              <a:gsLst>
+                <a:gs pos="0">
+                  <a:srgbClr val="08306B"/>
+                </a:gs>
+                <a:gs pos="100000">
+                  <a:srgbClr val="F7FBFF"/>
+                </a:gs>
+              </a:gsLst>
+              <a:lin ang="10800000" scaled="1"/>
+              <a:tileRect/>
+            </a:gradFill>
+            <a:ln>
+              <a:noFill/>
+            </a:ln>
+          </p:spPr>
+          <p:style>
+            <a:lnRef idx="2">
+              <a:schemeClr val="accent1">
+                <a:shade val="50000"/>
+              </a:schemeClr>
+            </a:lnRef>
+            <a:fillRef idx="1">
+              <a:schemeClr val="accent1"/>
+            </a:fillRef>
+            <a:effectRef idx="0">
+              <a:schemeClr val="accent1"/>
+            </a:effectRef>
+            <a:fontRef idx="minor">
+              <a:schemeClr val="lt1"/>
+            </a:fontRef>
+          </p:style>
+          <p:txBody>
+            <a:bodyPr rtlCol="0" anchor="ctr"/>
+            <a:lstStyle/>
+            <a:p>
+              <a:pPr algn="ctr"/>
+              <a:endParaRPr lang="de-DE">
+                <a:solidFill>
+                  <a:schemeClr val="tx1"/>
+                </a:solidFill>
+              </a:endParaRPr>
+            </a:p>
+          </p:txBody>
+        </p:sp>
+        <p:cxnSp>
+          <p:nvCxnSpPr>
+            <p:cNvPr id="11" name="Gerader Verbinder 10"/>
+            <p:cNvCxnSpPr/>
+            <p:nvPr/>
+          </p:nvCxnSpPr>
+          <p:spPr>
+            <a:xfrm>
+              <a:off x="978694" y="2267133"/>
+              <a:ext cx="0" cy="142973"/>
+            </a:xfrm>
+            <a:prstGeom prst="line">
+              <a:avLst/>
+            </a:prstGeom>
+            <a:ln w="19050">
+              <a:solidFill>
+                <a:schemeClr val="tx1"/>
+              </a:solidFill>
+            </a:ln>
+          </p:spPr>
+          <p:style>
+            <a:lnRef idx="1">
+              <a:schemeClr val="accent1"/>
+            </a:lnRef>
+            <a:fillRef idx="0">
+              <a:schemeClr val="accent1"/>
+            </a:fillRef>
+            <a:effectRef idx="0">
+              <a:schemeClr val="accent1"/>
+            </a:effectRef>
+            <a:fontRef idx="minor">
+              <a:schemeClr val="tx1"/>
+            </a:fontRef>
+          </p:style>
+        </p:cxnSp>
+        <p:cxnSp>
+          <p:nvCxnSpPr>
+            <p:cNvPr id="12" name="Gerader Verbinder 11"/>
+            <p:cNvCxnSpPr/>
+            <p:nvPr/>
+          </p:nvCxnSpPr>
+          <p:spPr>
+            <a:xfrm>
+              <a:off x="2538412" y="2267132"/>
+              <a:ext cx="0" cy="142973"/>
+            </a:xfrm>
+            <a:prstGeom prst="line">
+              <a:avLst/>
+            </a:prstGeom>
+            <a:ln w="19050">
+              <a:solidFill>
+                <a:schemeClr val="tx1"/>
+              </a:solidFill>
+            </a:ln>
+          </p:spPr>
+          <p:style>
+            <a:lnRef idx="1">
+              <a:schemeClr val="accent1"/>
+            </a:lnRef>
+            <a:fillRef idx="0">
+              <a:schemeClr val="accent1"/>
+            </a:fillRef>
+            <a:effectRef idx="0">
+              <a:schemeClr val="accent1"/>
+            </a:effectRef>
+            <a:fontRef idx="minor">
+              <a:schemeClr val="tx1"/>
+            </a:fontRef>
+          </p:style>
+        </p:cxnSp>
+        <p:sp>
+          <p:nvSpPr>
+            <p:cNvPr id="13" name="Textfeld 12"/>
+            <p:cNvSpPr txBox="1"/>
+            <p:nvPr/>
+          </p:nvSpPr>
+          <p:spPr>
+            <a:xfrm>
+              <a:off x="822241" y="2410105"/>
+              <a:ext cx="312907" cy="369332"/>
+            </a:xfrm>
+            <a:prstGeom prst="rect">
+              <a:avLst/>
+            </a:prstGeom>
+            <a:noFill/>
+          </p:spPr>
+          <p:txBody>
+            <a:bodyPr wrap="none" rtlCol="0">
+              <a:spAutoFit/>
+            </a:bodyPr>
+            <a:lstStyle/>
+            <a:p>
+              <a:pPr algn="ctr"/>
+              <a:r>
+                <a:rPr lang="de-DE" dirty="0" smtClean="0">
+                  <a:latin typeface="Corbel" panose="020B0503020204020204" pitchFamily="34" charset="0"/>
+                  <a:cs typeface="Arial" panose="020B0604020202020204" pitchFamily="34" charset="0"/>
+                </a:rPr>
+                <a:t>0</a:t>
+              </a:r>
+              <a:endParaRPr lang="de-DE" dirty="0">
+                <a:latin typeface="Corbel" panose="020B0503020204020204" pitchFamily="34" charset="0"/>
+                <a:cs typeface="Arial" panose="020B0604020202020204" pitchFamily="34" charset="0"/>
+              </a:endParaRPr>
+            </a:p>
+          </p:txBody>
+        </p:sp>
+        <p:sp>
+          <p:nvSpPr>
+            <p:cNvPr id="14" name="Textfeld 13"/>
+            <p:cNvSpPr txBox="1"/>
+            <p:nvPr/>
+          </p:nvSpPr>
+          <p:spPr>
+            <a:xfrm>
+              <a:off x="2393981" y="2410105"/>
+              <a:ext cx="288862" cy="369332"/>
+            </a:xfrm>
+            <a:prstGeom prst="rect">
+              <a:avLst/>
+            </a:prstGeom>
+            <a:noFill/>
+          </p:spPr>
+          <p:txBody>
+            <a:bodyPr wrap="none" rtlCol="0">
+              <a:spAutoFit/>
+            </a:bodyPr>
+            <a:lstStyle/>
+            <a:p>
+              <a:pPr algn="ctr"/>
+              <a:r>
+                <a:rPr lang="de-DE" dirty="0" smtClean="0">
+                  <a:latin typeface="Corbel" panose="020B0503020204020204" pitchFamily="34" charset="0"/>
+                  <a:cs typeface="Arial" panose="020B0604020202020204" pitchFamily="34" charset="0"/>
+                </a:rPr>
+                <a:t>1</a:t>
+              </a:r>
+              <a:endParaRPr lang="de-DE" dirty="0">
+                <a:latin typeface="Corbel" panose="020B0503020204020204" pitchFamily="34" charset="0"/>
+                <a:cs typeface="Arial" panose="020B0604020202020204" pitchFamily="34" charset="0"/>
+              </a:endParaRPr>
+            </a:p>
+          </p:txBody>
+        </p:sp>
+        <p:sp>
+          <p:nvSpPr>
+            <p:cNvPr id="15" name="Textfeld 14"/>
+            <p:cNvSpPr txBox="1"/>
+            <p:nvPr/>
+          </p:nvSpPr>
+          <p:spPr>
+            <a:xfrm>
+              <a:off x="864394" y="1844314"/>
+              <a:ext cx="1907381" cy="369332"/>
+            </a:xfrm>
+            <a:prstGeom prst="rect">
+              <a:avLst/>
+            </a:prstGeom>
+            <a:noFill/>
+          </p:spPr>
+          <p:txBody>
+            <a:bodyPr wrap="square" rtlCol="0">
+              <a:spAutoFit/>
+            </a:bodyPr>
+            <a:lstStyle/>
+            <a:p>
+              <a:r>
+                <a:rPr lang="de-DE" dirty="0" err="1" smtClean="0">
+                  <a:latin typeface="Corbel" panose="020B0503020204020204" pitchFamily="34" charset="0"/>
+                  <a:cs typeface="Arial" panose="020B0604020202020204" pitchFamily="34" charset="0"/>
+                </a:rPr>
+                <a:t>Middle</a:t>
+              </a:r>
+              <a:r>
+                <a:rPr lang="de-DE" dirty="0" smtClean="0">
+                  <a:latin typeface="Corbel" panose="020B0503020204020204" pitchFamily="34" charset="0"/>
+                  <a:cs typeface="Arial" panose="020B0604020202020204" pitchFamily="34" charset="0"/>
+                </a:rPr>
+                <a:t> </a:t>
+              </a:r>
+              <a:r>
+                <a:rPr lang="de-DE" dirty="0" err="1" smtClean="0">
+                  <a:latin typeface="Corbel" panose="020B0503020204020204" pitchFamily="34" charset="0"/>
+                  <a:cs typeface="Arial" panose="020B0604020202020204" pitchFamily="34" charset="0"/>
+                </a:rPr>
+                <a:t>Paleolithic</a:t>
+              </a:r>
+              <a:endParaRPr lang="de-DE" dirty="0">
+                <a:latin typeface="Corbel" panose="020B0503020204020204" pitchFamily="34" charset="0"/>
+                <a:cs typeface="Arial" panose="020B0604020202020204" pitchFamily="34" charset="0"/>
+              </a:endParaRPr>
+            </a:p>
+          </p:txBody>
+        </p:sp>
+      </p:grpSp>
+      <p:grpSp>
+        <p:nvGrpSpPr>
+          <p:cNvPr id="16" name="Gruppieren 15"/>
+          <p:cNvGrpSpPr/>
+          <p:nvPr/>
+        </p:nvGrpSpPr>
+        <p:grpSpPr>
+          <a:xfrm>
+            <a:off x="694854" y="4662277"/>
+            <a:ext cx="2519686" cy="935123"/>
+            <a:chOff x="822241" y="1844314"/>
+            <a:chExt cx="2519686" cy="935123"/>
+          </a:xfrm>
+        </p:grpSpPr>
+        <p:sp>
+          <p:nvSpPr>
+            <p:cNvPr id="17" name="Rechteck 16"/>
+            <p:cNvSpPr/>
+            <p:nvPr/>
+          </p:nvSpPr>
+          <p:spPr>
+            <a:xfrm>
+              <a:off x="978694" y="2267133"/>
+              <a:ext cx="1559718" cy="36000"/>
+            </a:xfrm>
+            <a:prstGeom prst="rect">
+              <a:avLst/>
+            </a:prstGeom>
+            <a:gradFill flip="none" rotWithShape="1">
+              <a:gsLst>
+                <a:gs pos="0">
+                  <a:srgbClr val="333333"/>
+                </a:gs>
+                <a:gs pos="100000">
+                  <a:srgbClr val="E6E6E6"/>
+                </a:gs>
+              </a:gsLst>
+              <a:lin ang="10800000" scaled="1"/>
+              <a:tileRect/>
+            </a:gradFill>
+            <a:ln>
+              <a:noFill/>
+            </a:ln>
+          </p:spPr>
+          <p:style>
+            <a:lnRef idx="2">
+              <a:schemeClr val="accent1">
+                <a:shade val="50000"/>
+              </a:schemeClr>
+            </a:lnRef>
+            <a:fillRef idx="1">
+              <a:schemeClr val="accent1"/>
+            </a:fillRef>
+            <a:effectRef idx="0">
+              <a:schemeClr val="accent1"/>
+            </a:effectRef>
+            <a:fontRef idx="minor">
+              <a:schemeClr val="lt1"/>
+            </a:fontRef>
+          </p:style>
+          <p:txBody>
+            <a:bodyPr rtlCol="0" anchor="ctr"/>
+            <a:lstStyle/>
+            <a:p>
+              <a:pPr algn="ctr"/>
+              <a:endParaRPr lang="de-DE">
+                <a:solidFill>
+                  <a:schemeClr val="tx1"/>
+                </a:solidFill>
+              </a:endParaRPr>
+            </a:p>
+          </p:txBody>
+        </p:sp>
+        <p:cxnSp>
+          <p:nvCxnSpPr>
+            <p:cNvPr id="18" name="Gerader Verbinder 17"/>
+            <p:cNvCxnSpPr/>
+            <p:nvPr/>
+          </p:nvCxnSpPr>
+          <p:spPr>
+            <a:xfrm>
+              <a:off x="978694" y="2267133"/>
+              <a:ext cx="0" cy="142973"/>
+            </a:xfrm>
+            <a:prstGeom prst="line">
+              <a:avLst/>
+            </a:prstGeom>
+            <a:ln w="19050">
+              <a:solidFill>
+                <a:schemeClr val="tx1"/>
+              </a:solidFill>
+            </a:ln>
+          </p:spPr>
+          <p:style>
+            <a:lnRef idx="1">
+              <a:schemeClr val="accent1"/>
+            </a:lnRef>
+            <a:fillRef idx="0">
+              <a:schemeClr val="accent1"/>
+            </a:fillRef>
+            <a:effectRef idx="0">
+              <a:schemeClr val="accent1"/>
+            </a:effectRef>
+            <a:fontRef idx="minor">
+              <a:schemeClr val="tx1"/>
+            </a:fontRef>
+          </p:style>
+        </p:cxnSp>
+        <p:cxnSp>
+          <p:nvCxnSpPr>
+            <p:cNvPr id="19" name="Gerader Verbinder 18"/>
+            <p:cNvCxnSpPr/>
+            <p:nvPr/>
+          </p:nvCxnSpPr>
+          <p:spPr>
+            <a:xfrm>
+              <a:off x="2538412" y="2267132"/>
+              <a:ext cx="0" cy="142973"/>
+            </a:xfrm>
+            <a:prstGeom prst="line">
+              <a:avLst/>
+            </a:prstGeom>
+            <a:ln w="19050">
+              <a:solidFill>
+                <a:schemeClr val="tx1"/>
+              </a:solidFill>
+            </a:ln>
+          </p:spPr>
+          <p:style>
+            <a:lnRef idx="1">
+              <a:schemeClr val="accent1"/>
+            </a:lnRef>
+            <a:fillRef idx="0">
+              <a:schemeClr val="accent1"/>
+            </a:fillRef>
+            <a:effectRef idx="0">
+              <a:schemeClr val="accent1"/>
+            </a:effectRef>
+            <a:fontRef idx="minor">
+              <a:schemeClr val="tx1"/>
+            </a:fontRef>
+          </p:style>
+        </p:cxnSp>
+        <p:sp>
+          <p:nvSpPr>
+            <p:cNvPr id="20" name="Textfeld 19"/>
+            <p:cNvSpPr txBox="1"/>
+            <p:nvPr/>
+          </p:nvSpPr>
+          <p:spPr>
+            <a:xfrm>
+              <a:off x="822241" y="2410105"/>
+              <a:ext cx="312907" cy="369332"/>
+            </a:xfrm>
+            <a:prstGeom prst="rect">
+              <a:avLst/>
+            </a:prstGeom>
+            <a:noFill/>
+          </p:spPr>
+          <p:txBody>
+            <a:bodyPr wrap="none" rtlCol="0">
+              <a:spAutoFit/>
+            </a:bodyPr>
+            <a:lstStyle/>
+            <a:p>
+              <a:pPr algn="ctr"/>
+              <a:r>
+                <a:rPr lang="de-DE" dirty="0" smtClean="0">
+                  <a:latin typeface="Corbel" panose="020B0503020204020204" pitchFamily="34" charset="0"/>
+                  <a:cs typeface="Arial" panose="020B0604020202020204" pitchFamily="34" charset="0"/>
+                </a:rPr>
+                <a:t>0</a:t>
+              </a:r>
+              <a:endParaRPr lang="de-DE" dirty="0">
+                <a:latin typeface="Corbel" panose="020B0503020204020204" pitchFamily="34" charset="0"/>
+                <a:cs typeface="Arial" panose="020B0604020202020204" pitchFamily="34" charset="0"/>
+              </a:endParaRPr>
+            </a:p>
+          </p:txBody>
+        </p:sp>
+        <p:sp>
+          <p:nvSpPr>
+            <p:cNvPr id="21" name="Textfeld 20"/>
+            <p:cNvSpPr txBox="1"/>
+            <p:nvPr/>
+          </p:nvSpPr>
+          <p:spPr>
+            <a:xfrm>
+              <a:off x="2393981" y="2410105"/>
+              <a:ext cx="288862" cy="369332"/>
+            </a:xfrm>
+            <a:prstGeom prst="rect">
+              <a:avLst/>
+            </a:prstGeom>
+            <a:noFill/>
+          </p:spPr>
+          <p:txBody>
+            <a:bodyPr wrap="none" rtlCol="0">
+              <a:spAutoFit/>
+            </a:bodyPr>
+            <a:lstStyle/>
+            <a:p>
+              <a:pPr algn="ctr"/>
+              <a:r>
+                <a:rPr lang="de-DE" dirty="0" smtClean="0">
+                  <a:latin typeface="Corbel" panose="020B0503020204020204" pitchFamily="34" charset="0"/>
+                  <a:cs typeface="Arial" panose="020B0604020202020204" pitchFamily="34" charset="0"/>
+                </a:rPr>
+                <a:t>1</a:t>
+              </a:r>
+              <a:endParaRPr lang="de-DE" dirty="0">
+                <a:latin typeface="Corbel" panose="020B0503020204020204" pitchFamily="34" charset="0"/>
+                <a:cs typeface="Arial" panose="020B0604020202020204" pitchFamily="34" charset="0"/>
+              </a:endParaRPr>
+            </a:p>
+          </p:txBody>
+        </p:sp>
+        <p:sp>
+          <p:nvSpPr>
+            <p:cNvPr id="22" name="Textfeld 21"/>
+            <p:cNvSpPr txBox="1"/>
+            <p:nvPr/>
+          </p:nvSpPr>
+          <p:spPr>
+            <a:xfrm>
+              <a:off x="864394" y="1844314"/>
+              <a:ext cx="2477533" cy="369332"/>
+            </a:xfrm>
+            <a:prstGeom prst="rect">
+              <a:avLst/>
+            </a:prstGeom>
+            <a:noFill/>
+          </p:spPr>
+          <p:txBody>
+            <a:bodyPr wrap="square" rtlCol="0">
+              <a:spAutoFit/>
+            </a:bodyPr>
+            <a:lstStyle/>
+            <a:p>
+              <a:r>
+                <a:rPr lang="de-DE" dirty="0" err="1" smtClean="0">
+                  <a:latin typeface="Corbel" panose="020B0503020204020204" pitchFamily="34" charset="0"/>
+                  <a:cs typeface="Arial" panose="020B0604020202020204" pitchFamily="34" charset="0"/>
+                </a:rPr>
+                <a:t>Between</a:t>
+              </a:r>
+              <a:r>
+                <a:rPr lang="de-DE" dirty="0" smtClean="0">
+                  <a:latin typeface="Corbel" panose="020B0503020204020204" pitchFamily="34" charset="0"/>
+                  <a:cs typeface="Arial" panose="020B0604020202020204" pitchFamily="34" charset="0"/>
+                </a:rPr>
+                <a:t> MSA </a:t>
+              </a:r>
+              <a:r>
+                <a:rPr lang="de-DE" dirty="0" err="1" smtClean="0">
+                  <a:latin typeface="Corbel" panose="020B0503020204020204" pitchFamily="34" charset="0"/>
+                  <a:cs typeface="Arial" panose="020B0604020202020204" pitchFamily="34" charset="0"/>
+                </a:rPr>
+                <a:t>and</a:t>
+              </a:r>
+              <a:r>
+                <a:rPr lang="de-DE" dirty="0" smtClean="0">
+                  <a:latin typeface="Corbel" panose="020B0503020204020204" pitchFamily="34" charset="0"/>
+                  <a:cs typeface="Arial" panose="020B0604020202020204" pitchFamily="34" charset="0"/>
+                </a:rPr>
+                <a:t> MP</a:t>
+              </a:r>
+              <a:endParaRPr lang="de-DE" dirty="0">
+                <a:latin typeface="Corbel" panose="020B0503020204020204" pitchFamily="34" charset="0"/>
+                <a:cs typeface="Arial" panose="020B0604020202020204" pitchFamily="34" charset="0"/>
+              </a:endParaRPr>
+            </a:p>
+          </p:txBody>
+        </p:sp>
+      </p:grpSp>
+    </p:spTree>
+    <p:extLst>
+      <p:ext uri="{BB962C8B-B14F-4D97-AF65-F5344CB8AC3E}">
+        <p14:creationId xmlns:p14="http://schemas.microsoft.com/office/powerpoint/2010/main" val="1154228737"/>
+      </p:ext>
+    </p:extLst>
+  </p:cSld>
+  <p:clrMapOvr>
+    <a:masterClrMapping/>
+  </p:clrMapOvr>
+</p:sld>
+</file>
+
 <file path=ppt/theme/theme1.xml><?xml version="1.0" encoding="utf-8"?>
 <a:theme xmlns:a="http://schemas.openxmlformats.org/drawingml/2006/main" name="Office">
   <a:themeElements>

</xml_diff>